<commit_message>
committing and push to development
</commit_message>
<xml_diff>
--- a/miscellaneous/Design.pptx
+++ b/miscellaneous/Design.pptx
@@ -9,9 +9,8 @@
     <p:sldId id="261" r:id="rId3"/>
     <p:sldId id="257" r:id="rId4"/>
     <p:sldId id="258" r:id="rId5"/>
-    <p:sldId id="260" r:id="rId6"/>
-    <p:sldId id="262" r:id="rId7"/>
-    <p:sldId id="263" r:id="rId8"/>
+    <p:sldId id="262" r:id="rId6"/>
+    <p:sldId id="260" r:id="rId7"/>
   </p:sldIdLst>
   <p:sldSz cx="6858000" cy="12192000"/>
   <p:notesSz cx="6858000" cy="9144000"/>
@@ -249,7 +248,7 @@
           <a:p>
             <a:fld id="{905A6D58-AEE0-4D5C-BA1B-ED7B87D79650}" type="datetimeFigureOut">
               <a:rPr lang="en-US" smtClean="0"/>
-              <a:t>3/20/2019</a:t>
+              <a:t>3/25/2019</a:t>
             </a:fld>
             <a:endParaRPr lang="en-US"/>
           </a:p>
@@ -419,7 +418,7 @@
           <a:p>
             <a:fld id="{905A6D58-AEE0-4D5C-BA1B-ED7B87D79650}" type="datetimeFigureOut">
               <a:rPr lang="en-US" smtClean="0"/>
-              <a:t>3/20/2019</a:t>
+              <a:t>3/25/2019</a:t>
             </a:fld>
             <a:endParaRPr lang="en-US"/>
           </a:p>
@@ -599,7 +598,7 @@
           <a:p>
             <a:fld id="{905A6D58-AEE0-4D5C-BA1B-ED7B87D79650}" type="datetimeFigureOut">
               <a:rPr lang="en-US" smtClean="0"/>
-              <a:t>3/20/2019</a:t>
+              <a:t>3/25/2019</a:t>
             </a:fld>
             <a:endParaRPr lang="en-US"/>
           </a:p>
@@ -769,7 +768,7 @@
           <a:p>
             <a:fld id="{905A6D58-AEE0-4D5C-BA1B-ED7B87D79650}" type="datetimeFigureOut">
               <a:rPr lang="en-US" smtClean="0"/>
-              <a:t>3/20/2019</a:t>
+              <a:t>3/25/2019</a:t>
             </a:fld>
             <a:endParaRPr lang="en-US"/>
           </a:p>
@@ -1013,7 +1012,7 @@
           <a:p>
             <a:fld id="{905A6D58-AEE0-4D5C-BA1B-ED7B87D79650}" type="datetimeFigureOut">
               <a:rPr lang="en-US" smtClean="0"/>
-              <a:t>3/20/2019</a:t>
+              <a:t>3/25/2019</a:t>
             </a:fld>
             <a:endParaRPr lang="en-US"/>
           </a:p>
@@ -1245,7 +1244,7 @@
           <a:p>
             <a:fld id="{905A6D58-AEE0-4D5C-BA1B-ED7B87D79650}" type="datetimeFigureOut">
               <a:rPr lang="en-US" smtClean="0"/>
-              <a:t>3/20/2019</a:t>
+              <a:t>3/25/2019</a:t>
             </a:fld>
             <a:endParaRPr lang="en-US"/>
           </a:p>
@@ -1612,7 +1611,7 @@
           <a:p>
             <a:fld id="{905A6D58-AEE0-4D5C-BA1B-ED7B87D79650}" type="datetimeFigureOut">
               <a:rPr lang="en-US" smtClean="0"/>
-              <a:t>3/20/2019</a:t>
+              <a:t>3/25/2019</a:t>
             </a:fld>
             <a:endParaRPr lang="en-US"/>
           </a:p>
@@ -1730,7 +1729,7 @@
           <a:p>
             <a:fld id="{905A6D58-AEE0-4D5C-BA1B-ED7B87D79650}" type="datetimeFigureOut">
               <a:rPr lang="en-US" smtClean="0"/>
-              <a:t>3/20/2019</a:t>
+              <a:t>3/25/2019</a:t>
             </a:fld>
             <a:endParaRPr lang="en-US"/>
           </a:p>
@@ -1825,7 +1824,7 @@
           <a:p>
             <a:fld id="{905A6D58-AEE0-4D5C-BA1B-ED7B87D79650}" type="datetimeFigureOut">
               <a:rPr lang="en-US" smtClean="0"/>
-              <a:t>3/20/2019</a:t>
+              <a:t>3/25/2019</a:t>
             </a:fld>
             <a:endParaRPr lang="en-US"/>
           </a:p>
@@ -2102,7 +2101,7 @@
           <a:p>
             <a:fld id="{905A6D58-AEE0-4D5C-BA1B-ED7B87D79650}" type="datetimeFigureOut">
               <a:rPr lang="en-US" smtClean="0"/>
-              <a:t>3/20/2019</a:t>
+              <a:t>3/25/2019</a:t>
             </a:fld>
             <a:endParaRPr lang="en-US"/>
           </a:p>
@@ -2359,7 +2358,7 @@
           <a:p>
             <a:fld id="{905A6D58-AEE0-4D5C-BA1B-ED7B87D79650}" type="datetimeFigureOut">
               <a:rPr lang="en-US" smtClean="0"/>
-              <a:t>3/20/2019</a:t>
+              <a:t>3/25/2019</a:t>
             </a:fld>
             <a:endParaRPr lang="en-US"/>
           </a:p>
@@ -2572,7 +2571,7 @@
           <a:p>
             <a:fld id="{905A6D58-AEE0-4D5C-BA1B-ED7B87D79650}" type="datetimeFigureOut">
               <a:rPr lang="en-US" smtClean="0"/>
-              <a:t>3/20/2019</a:t>
+              <a:t>3/25/2019</a:t>
             </a:fld>
             <a:endParaRPr lang="en-US"/>
           </a:p>
@@ -5849,8 +5848,8 @@
         </p:blipFill>
         <p:spPr bwMode="auto">
           <a:xfrm>
-            <a:off x="-5435788" y="2569048"/>
-            <a:ext cx="5256171" cy="8144631"/>
+            <a:off x="-5168547" y="2672313"/>
+            <a:ext cx="4749353" cy="7359298"/>
           </a:xfrm>
           <a:prstGeom prst="rect">
             <a:avLst/>
@@ -9361,6 +9360,479 @@
           </a:p>
         </p:txBody>
       </p:sp>
+      <p:sp>
+        <p:nvSpPr>
+          <p:cNvPr id="41" name="TextBox 40">
+            <a:extLst>
+              <a:ext uri="{FF2B5EF4-FFF2-40B4-BE49-F238E27FC236}">
+                <a16:creationId xmlns:a16="http://schemas.microsoft.com/office/drawing/2014/main" id="{D7A80749-D1E2-4748-8489-6A04BB570EAE}"/>
+              </a:ext>
+            </a:extLst>
+          </p:cNvPr>
+          <p:cNvSpPr txBox="1"/>
+          <p:nvPr/>
+        </p:nvSpPr>
+        <p:spPr>
+          <a:xfrm>
+            <a:off x="102552" y="1443721"/>
+            <a:ext cx="1005840" cy="707886"/>
+          </a:xfrm>
+          <a:prstGeom prst="rect">
+            <a:avLst/>
+          </a:prstGeom>
+          <a:noFill/>
+        </p:spPr>
+        <p:txBody>
+          <a:bodyPr wrap="square" rtlCol="0">
+            <a:spAutoFit/>
+          </a:bodyPr>
+          <a:lstStyle/>
+          <a:p>
+            <a:pPr algn="ctr"/>
+            <a:r>
+              <a:rPr lang="en-US" sz="4000" b="1" dirty="0">
+                <a:solidFill>
+                  <a:srgbClr val="01D277"/>
+                </a:solidFill>
+                <a:latin typeface="Agency FB" panose="020B0503020202020204" pitchFamily="34" charset="0"/>
+              </a:rPr>
+              <a:t>HR</a:t>
+            </a:r>
+          </a:p>
+        </p:txBody>
+      </p:sp>
+      <p:sp>
+        <p:nvSpPr>
+          <p:cNvPr id="42" name="Rectangle 41">
+            <a:extLst>
+              <a:ext uri="{FF2B5EF4-FFF2-40B4-BE49-F238E27FC236}">
+                <a16:creationId xmlns:a16="http://schemas.microsoft.com/office/drawing/2014/main" id="{677E4F07-3BA2-4473-96FC-1A6492D7D7C1}"/>
+              </a:ext>
+            </a:extLst>
+          </p:cNvPr>
+          <p:cNvSpPr/>
+          <p:nvPr/>
+        </p:nvSpPr>
+        <p:spPr>
+          <a:xfrm>
+            <a:off x="257492" y="1490324"/>
+            <a:ext cx="53340" cy="281940"/>
+          </a:xfrm>
+          <a:prstGeom prst="rect">
+            <a:avLst/>
+          </a:prstGeom>
+          <a:solidFill>
+            <a:srgbClr val="01D277"/>
+          </a:solidFill>
+          <a:ln>
+            <a:solidFill>
+              <a:srgbClr val="01D277"/>
+            </a:solidFill>
+          </a:ln>
+        </p:spPr>
+        <p:style>
+          <a:lnRef idx="2">
+            <a:schemeClr val="accent1">
+              <a:shade val="50000"/>
+            </a:schemeClr>
+          </a:lnRef>
+          <a:fillRef idx="1">
+            <a:schemeClr val="accent1"/>
+          </a:fillRef>
+          <a:effectRef idx="0">
+            <a:schemeClr val="accent1"/>
+          </a:effectRef>
+          <a:fontRef idx="minor">
+            <a:schemeClr val="lt1"/>
+          </a:fontRef>
+        </p:style>
+        <p:txBody>
+          <a:bodyPr rtlCol="0" anchor="ctr"/>
+          <a:lstStyle/>
+          <a:p>
+            <a:pPr algn="ctr"/>
+            <a:endParaRPr lang="en-US"/>
+          </a:p>
+        </p:txBody>
+      </p:sp>
+      <p:sp>
+        <p:nvSpPr>
+          <p:cNvPr id="43" name="Rectangle 42">
+            <a:extLst>
+              <a:ext uri="{FF2B5EF4-FFF2-40B4-BE49-F238E27FC236}">
+                <a16:creationId xmlns:a16="http://schemas.microsoft.com/office/drawing/2014/main" id="{DE2E9F06-4466-4D01-9667-B1683174C291}"/>
+              </a:ext>
+            </a:extLst>
+          </p:cNvPr>
+          <p:cNvSpPr/>
+          <p:nvPr/>
+        </p:nvSpPr>
+        <p:spPr>
+          <a:xfrm rot="5400000">
+            <a:off x="371792" y="1372849"/>
+            <a:ext cx="53340" cy="281940"/>
+          </a:xfrm>
+          <a:prstGeom prst="rect">
+            <a:avLst/>
+          </a:prstGeom>
+          <a:solidFill>
+            <a:srgbClr val="01D277"/>
+          </a:solidFill>
+          <a:ln>
+            <a:solidFill>
+              <a:srgbClr val="01D277"/>
+            </a:solidFill>
+          </a:ln>
+        </p:spPr>
+        <p:style>
+          <a:lnRef idx="2">
+            <a:schemeClr val="accent1">
+              <a:shade val="50000"/>
+            </a:schemeClr>
+          </a:lnRef>
+          <a:fillRef idx="1">
+            <a:schemeClr val="accent1"/>
+          </a:fillRef>
+          <a:effectRef idx="0">
+            <a:schemeClr val="accent1"/>
+          </a:effectRef>
+          <a:fontRef idx="minor">
+            <a:schemeClr val="lt1"/>
+          </a:fontRef>
+        </p:style>
+        <p:txBody>
+          <a:bodyPr rtlCol="0" anchor="ctr"/>
+          <a:lstStyle/>
+          <a:p>
+            <a:pPr algn="ctr"/>
+            <a:endParaRPr lang="en-US"/>
+          </a:p>
+        </p:txBody>
+      </p:sp>
+      <p:sp>
+        <p:nvSpPr>
+          <p:cNvPr id="44" name="Rectangle 43">
+            <a:extLst>
+              <a:ext uri="{FF2B5EF4-FFF2-40B4-BE49-F238E27FC236}">
+                <a16:creationId xmlns:a16="http://schemas.microsoft.com/office/drawing/2014/main" id="{C97CA399-9E88-40E9-A0CB-E89984057DB5}"/>
+              </a:ext>
+            </a:extLst>
+          </p:cNvPr>
+          <p:cNvSpPr/>
+          <p:nvPr/>
+        </p:nvSpPr>
+        <p:spPr>
+          <a:xfrm rot="16200000">
+            <a:off x="794067" y="1946378"/>
+            <a:ext cx="53340" cy="281940"/>
+          </a:xfrm>
+          <a:prstGeom prst="rect">
+            <a:avLst/>
+          </a:prstGeom>
+          <a:solidFill>
+            <a:srgbClr val="01D277"/>
+          </a:solidFill>
+          <a:ln>
+            <a:solidFill>
+              <a:srgbClr val="01D277"/>
+            </a:solidFill>
+          </a:ln>
+        </p:spPr>
+        <p:style>
+          <a:lnRef idx="2">
+            <a:schemeClr val="accent1">
+              <a:shade val="50000"/>
+            </a:schemeClr>
+          </a:lnRef>
+          <a:fillRef idx="1">
+            <a:schemeClr val="accent1"/>
+          </a:fillRef>
+          <a:effectRef idx="0">
+            <a:schemeClr val="accent1"/>
+          </a:effectRef>
+          <a:fontRef idx="minor">
+            <a:schemeClr val="lt1"/>
+          </a:fontRef>
+        </p:style>
+        <p:txBody>
+          <a:bodyPr rtlCol="0" anchor="ctr"/>
+          <a:lstStyle/>
+          <a:p>
+            <a:pPr algn="ctr"/>
+            <a:endParaRPr lang="en-US"/>
+          </a:p>
+        </p:txBody>
+      </p:sp>
+      <p:sp>
+        <p:nvSpPr>
+          <p:cNvPr id="45" name="Rectangle 44">
+            <a:extLst>
+              <a:ext uri="{FF2B5EF4-FFF2-40B4-BE49-F238E27FC236}">
+                <a16:creationId xmlns:a16="http://schemas.microsoft.com/office/drawing/2014/main" id="{CC2C1343-2D60-4472-9F97-99861C32EAFA}"/>
+              </a:ext>
+            </a:extLst>
+          </p:cNvPr>
+          <p:cNvSpPr/>
+          <p:nvPr/>
+        </p:nvSpPr>
+        <p:spPr>
+          <a:xfrm>
+            <a:off x="908367" y="1828903"/>
+            <a:ext cx="53340" cy="281940"/>
+          </a:xfrm>
+          <a:prstGeom prst="rect">
+            <a:avLst/>
+          </a:prstGeom>
+          <a:solidFill>
+            <a:srgbClr val="01D277"/>
+          </a:solidFill>
+          <a:ln>
+            <a:solidFill>
+              <a:srgbClr val="01D277"/>
+            </a:solidFill>
+          </a:ln>
+        </p:spPr>
+        <p:style>
+          <a:lnRef idx="2">
+            <a:schemeClr val="accent1">
+              <a:shade val="50000"/>
+            </a:schemeClr>
+          </a:lnRef>
+          <a:fillRef idx="1">
+            <a:schemeClr val="accent1"/>
+          </a:fillRef>
+          <a:effectRef idx="0">
+            <a:schemeClr val="accent1"/>
+          </a:effectRef>
+          <a:fontRef idx="minor">
+            <a:schemeClr val="lt1"/>
+          </a:fontRef>
+        </p:style>
+        <p:txBody>
+          <a:bodyPr rtlCol="0" anchor="ctr"/>
+          <a:lstStyle/>
+          <a:p>
+            <a:pPr algn="ctr"/>
+            <a:endParaRPr lang="en-US"/>
+          </a:p>
+        </p:txBody>
+      </p:sp>
+      <p:sp>
+        <p:nvSpPr>
+          <p:cNvPr id="46" name="Rectangle 45">
+            <a:extLst>
+              <a:ext uri="{FF2B5EF4-FFF2-40B4-BE49-F238E27FC236}">
+                <a16:creationId xmlns:a16="http://schemas.microsoft.com/office/drawing/2014/main" id="{7EA27E44-60F8-48C2-B507-83AB3DA4F834}"/>
+              </a:ext>
+            </a:extLst>
+          </p:cNvPr>
+          <p:cNvSpPr/>
+          <p:nvPr/>
+        </p:nvSpPr>
+        <p:spPr>
+          <a:xfrm>
+            <a:off x="257492" y="1838165"/>
+            <a:ext cx="53340" cy="281940"/>
+          </a:xfrm>
+          <a:prstGeom prst="rect">
+            <a:avLst/>
+          </a:prstGeom>
+          <a:solidFill>
+            <a:srgbClr val="01D277"/>
+          </a:solidFill>
+          <a:ln>
+            <a:solidFill>
+              <a:srgbClr val="01D277"/>
+            </a:solidFill>
+          </a:ln>
+        </p:spPr>
+        <p:style>
+          <a:lnRef idx="2">
+            <a:schemeClr val="accent1">
+              <a:shade val="50000"/>
+            </a:schemeClr>
+          </a:lnRef>
+          <a:fillRef idx="1">
+            <a:schemeClr val="accent1"/>
+          </a:fillRef>
+          <a:effectRef idx="0">
+            <a:schemeClr val="accent1"/>
+          </a:effectRef>
+          <a:fontRef idx="minor">
+            <a:schemeClr val="lt1"/>
+          </a:fontRef>
+        </p:style>
+        <p:txBody>
+          <a:bodyPr rtlCol="0" anchor="ctr"/>
+          <a:lstStyle/>
+          <a:p>
+            <a:pPr algn="ctr"/>
+            <a:endParaRPr lang="en-US"/>
+          </a:p>
+        </p:txBody>
+      </p:sp>
+      <p:sp>
+        <p:nvSpPr>
+          <p:cNvPr id="47" name="Rectangle 46">
+            <a:extLst>
+              <a:ext uri="{FF2B5EF4-FFF2-40B4-BE49-F238E27FC236}">
+                <a16:creationId xmlns:a16="http://schemas.microsoft.com/office/drawing/2014/main" id="{309CEB71-5F3A-497B-A02E-31A1CDDBFED1}"/>
+              </a:ext>
+            </a:extLst>
+          </p:cNvPr>
+          <p:cNvSpPr/>
+          <p:nvPr/>
+        </p:nvSpPr>
+        <p:spPr>
+          <a:xfrm rot="5400000">
+            <a:off x="371792" y="1952465"/>
+            <a:ext cx="53340" cy="281940"/>
+          </a:xfrm>
+          <a:prstGeom prst="rect">
+            <a:avLst/>
+          </a:prstGeom>
+          <a:solidFill>
+            <a:srgbClr val="01D277"/>
+          </a:solidFill>
+          <a:ln>
+            <a:solidFill>
+              <a:srgbClr val="01D277"/>
+            </a:solidFill>
+          </a:ln>
+        </p:spPr>
+        <p:style>
+          <a:lnRef idx="2">
+            <a:schemeClr val="accent1">
+              <a:shade val="50000"/>
+            </a:schemeClr>
+          </a:lnRef>
+          <a:fillRef idx="1">
+            <a:schemeClr val="accent1"/>
+          </a:fillRef>
+          <a:effectRef idx="0">
+            <a:schemeClr val="accent1"/>
+          </a:effectRef>
+          <a:fontRef idx="minor">
+            <a:schemeClr val="lt1"/>
+          </a:fontRef>
+        </p:style>
+        <p:txBody>
+          <a:bodyPr rtlCol="0" anchor="ctr"/>
+          <a:lstStyle/>
+          <a:p>
+            <a:pPr algn="ctr"/>
+            <a:endParaRPr lang="en-US"/>
+          </a:p>
+        </p:txBody>
+      </p:sp>
+      <p:sp>
+        <p:nvSpPr>
+          <p:cNvPr id="48" name="Rectangle 47">
+            <a:extLst>
+              <a:ext uri="{FF2B5EF4-FFF2-40B4-BE49-F238E27FC236}">
+                <a16:creationId xmlns:a16="http://schemas.microsoft.com/office/drawing/2014/main" id="{B5109F9D-9A71-4C09-B655-ABBDA18B13EC}"/>
+              </a:ext>
+            </a:extLst>
+          </p:cNvPr>
+          <p:cNvSpPr/>
+          <p:nvPr/>
+        </p:nvSpPr>
+        <p:spPr>
+          <a:xfrm rot="5400000">
+            <a:off x="794067" y="1376024"/>
+            <a:ext cx="53340" cy="281940"/>
+          </a:xfrm>
+          <a:prstGeom prst="rect">
+            <a:avLst/>
+          </a:prstGeom>
+          <a:solidFill>
+            <a:srgbClr val="01D277"/>
+          </a:solidFill>
+          <a:ln>
+            <a:solidFill>
+              <a:srgbClr val="01D277"/>
+            </a:solidFill>
+          </a:ln>
+        </p:spPr>
+        <p:style>
+          <a:lnRef idx="2">
+            <a:schemeClr val="accent1">
+              <a:shade val="50000"/>
+            </a:schemeClr>
+          </a:lnRef>
+          <a:fillRef idx="1">
+            <a:schemeClr val="accent1"/>
+          </a:fillRef>
+          <a:effectRef idx="0">
+            <a:schemeClr val="accent1"/>
+          </a:effectRef>
+          <a:fontRef idx="minor">
+            <a:schemeClr val="lt1"/>
+          </a:fontRef>
+        </p:style>
+        <p:txBody>
+          <a:bodyPr rtlCol="0" anchor="ctr"/>
+          <a:lstStyle/>
+          <a:p>
+            <a:pPr algn="ctr"/>
+            <a:endParaRPr lang="en-US"/>
+          </a:p>
+        </p:txBody>
+      </p:sp>
+      <p:sp>
+        <p:nvSpPr>
+          <p:cNvPr id="49" name="Rectangle 48">
+            <a:extLst>
+              <a:ext uri="{FF2B5EF4-FFF2-40B4-BE49-F238E27FC236}">
+                <a16:creationId xmlns:a16="http://schemas.microsoft.com/office/drawing/2014/main" id="{3CC6F905-6349-4947-B633-D8CD721654D6}"/>
+              </a:ext>
+            </a:extLst>
+          </p:cNvPr>
+          <p:cNvSpPr/>
+          <p:nvPr/>
+        </p:nvSpPr>
+        <p:spPr>
+          <a:xfrm rot="10800000">
+            <a:off x="908367" y="1490324"/>
+            <a:ext cx="53340" cy="281940"/>
+          </a:xfrm>
+          <a:prstGeom prst="rect">
+            <a:avLst/>
+          </a:prstGeom>
+          <a:solidFill>
+            <a:srgbClr val="01D277"/>
+          </a:solidFill>
+          <a:ln>
+            <a:solidFill>
+              <a:srgbClr val="01D277"/>
+            </a:solidFill>
+          </a:ln>
+        </p:spPr>
+        <p:style>
+          <a:lnRef idx="2">
+            <a:schemeClr val="accent1">
+              <a:shade val="50000"/>
+            </a:schemeClr>
+          </a:lnRef>
+          <a:fillRef idx="1">
+            <a:schemeClr val="accent1"/>
+          </a:fillRef>
+          <a:effectRef idx="0">
+            <a:schemeClr val="accent1"/>
+          </a:effectRef>
+          <a:fontRef idx="minor">
+            <a:schemeClr val="lt1"/>
+          </a:fontRef>
+        </p:style>
+        <p:txBody>
+          <a:bodyPr rtlCol="0" anchor="ctr"/>
+          <a:lstStyle/>
+          <a:p>
+            <a:pPr algn="ctr"/>
+            <a:endParaRPr lang="en-US"/>
+          </a:p>
+        </p:txBody>
+      </p:sp>
     </p:spTree>
     <p:extLst>
       <p:ext uri="{BB962C8B-B14F-4D97-AF65-F5344CB8AC3E}">
@@ -11010,223 +11482,60 @@
           <a:chExt cx="0" cy="0"/>
         </a:xfrm>
       </p:grpSpPr>
-      <p:pic>
-        <p:nvPicPr>
-          <p:cNvPr id="4" name="Picture 6" descr="two reels">
-            <a:extLst>
-              <a:ext uri="{FF2B5EF4-FFF2-40B4-BE49-F238E27FC236}">
-                <a16:creationId xmlns:a16="http://schemas.microsoft.com/office/drawing/2014/main" id="{C0675FDC-DF61-4848-A261-7BE95F856E58}"/>
-              </a:ext>
-            </a:extLst>
-          </p:cNvPr>
-          <p:cNvPicPr>
-            <a:picLocks noChangeAspect="1" noChangeArrowheads="1"/>
-          </p:cNvPicPr>
-          <p:nvPr/>
-        </p:nvPicPr>
-        <p:blipFill rotWithShape="1">
-          <a:blip r:embed="rId2">
-            <a:duotone>
-              <a:prstClr val="black"/>
-              <a:schemeClr val="tx2">
-                <a:tint val="45000"/>
-                <a:satMod val="400000"/>
-              </a:schemeClr>
-            </a:duotone>
-            <a:extLst>
-              <a:ext uri="{28A0092B-C50C-407E-A947-70E740481C1C}">
-                <a14:useLocalDpi xmlns:a14="http://schemas.microsoft.com/office/drawing/2010/main" val="0"/>
-              </a:ext>
-            </a:extLst>
-          </a:blip>
-          <a:srcRect t="-708" b="8305"/>
-          <a:stretch/>
-        </p:blipFill>
-        <p:spPr bwMode="auto">
-          <a:xfrm>
-            <a:off x="0" y="1332305"/>
-            <a:ext cx="6858000" cy="4226129"/>
-          </a:xfrm>
-          <a:prstGeom prst="rect">
-            <a:avLst/>
-          </a:prstGeom>
-          <a:noFill/>
-          <a:extLst>
-            <a:ext uri="{909E8E84-426E-40DD-AFC4-6F175D3DCCD1}">
-              <a14:hiddenFill xmlns:a14="http://schemas.microsoft.com/office/drawing/2010/main">
-                <a:solidFill>
-                  <a:srgbClr val="FFFFFF"/>
-                </a:solidFill>
-              </a14:hiddenFill>
-            </a:ext>
-          </a:extLst>
-        </p:spPr>
-      </p:pic>
-      <p:pic>
-        <p:nvPicPr>
-          <p:cNvPr id="5" name="Picture 6" descr="two reels">
-            <a:extLst>
-              <a:ext uri="{FF2B5EF4-FFF2-40B4-BE49-F238E27FC236}">
-                <a16:creationId xmlns:a16="http://schemas.microsoft.com/office/drawing/2014/main" id="{9A0FC2AA-4BDB-4DD4-AAD3-79A03F67CE04}"/>
-              </a:ext>
-            </a:extLst>
-          </p:cNvPr>
-          <p:cNvPicPr>
-            <a:picLocks noChangeAspect="1" noChangeArrowheads="1"/>
-          </p:cNvPicPr>
-          <p:nvPr/>
-        </p:nvPicPr>
-        <p:blipFill rotWithShape="1">
-          <a:blip r:embed="rId2">
-            <a:duotone>
-              <a:prstClr val="black"/>
-              <a:schemeClr val="tx2">
-                <a:tint val="45000"/>
-                <a:satMod val="400000"/>
-              </a:schemeClr>
-            </a:duotone>
-            <a:extLst>
-              <a:ext uri="{28A0092B-C50C-407E-A947-70E740481C1C}">
-                <a14:useLocalDpi xmlns:a14="http://schemas.microsoft.com/office/drawing/2010/main" val="0"/>
-              </a:ext>
-            </a:extLst>
-          </a:blip>
-          <a:srcRect t="-708" b="8305"/>
-          <a:stretch/>
-        </p:blipFill>
-        <p:spPr bwMode="auto">
-          <a:xfrm>
-            <a:off x="-1" y="6292679"/>
-            <a:ext cx="6858000" cy="4226129"/>
-          </a:xfrm>
-          <a:prstGeom prst="rect">
-            <a:avLst/>
-          </a:prstGeom>
-          <a:noFill/>
-          <a:extLst>
-            <a:ext uri="{909E8E84-426E-40DD-AFC4-6F175D3DCCD1}">
-              <a14:hiddenFill xmlns:a14="http://schemas.microsoft.com/office/drawing/2010/main">
-                <a:solidFill>
-                  <a:srgbClr val="FFFFFF"/>
-                </a:solidFill>
-              </a14:hiddenFill>
-            </a:ext>
-          </a:extLst>
-        </p:spPr>
-      </p:pic>
-      <p:sp>
-        <p:nvSpPr>
-          <p:cNvPr id="6" name="Rectangle 5">
-            <a:extLst>
-              <a:ext uri="{FF2B5EF4-FFF2-40B4-BE49-F238E27FC236}">
-                <a16:creationId xmlns:a16="http://schemas.microsoft.com/office/drawing/2014/main" id="{8670447E-D037-4A85-9630-12DD99E1CB2F}"/>
-              </a:ext>
-            </a:extLst>
-          </p:cNvPr>
-          <p:cNvSpPr/>
-          <p:nvPr/>
-        </p:nvSpPr>
-        <p:spPr>
-          <a:xfrm>
-            <a:off x="-2" y="6326158"/>
-            <a:ext cx="6858000" cy="4194630"/>
-          </a:xfrm>
-          <a:prstGeom prst="rect">
-            <a:avLst/>
-          </a:prstGeom>
-          <a:solidFill>
-            <a:schemeClr val="accent1">
-              <a:lumMod val="50000"/>
-              <a:alpha val="72000"/>
-            </a:schemeClr>
-          </a:solidFill>
-          <a:ln>
-            <a:noFill/>
-          </a:ln>
-        </p:spPr>
-        <p:style>
-          <a:lnRef idx="2">
-            <a:schemeClr val="accent1">
-              <a:shade val="50000"/>
-            </a:schemeClr>
-          </a:lnRef>
-          <a:fillRef idx="1">
-            <a:schemeClr val="accent1"/>
-          </a:fillRef>
-          <a:effectRef idx="0">
-            <a:schemeClr val="accent1"/>
-          </a:effectRef>
-          <a:fontRef idx="minor">
-            <a:schemeClr val="lt1"/>
-          </a:fontRef>
-        </p:style>
-        <p:txBody>
-          <a:bodyPr rtlCol="0" anchor="ctr"/>
-          <a:lstStyle/>
-          <a:p>
-            <a:pPr algn="ctr"/>
-            <a:endParaRPr lang="en-US" dirty="0">
-              <a:latin typeface="Agency FB" panose="020B0503020202020204" pitchFamily="34" charset="0"/>
-            </a:endParaRPr>
-          </a:p>
-        </p:txBody>
-      </p:sp>
-      <p:pic>
-        <p:nvPicPr>
-          <p:cNvPr id="7" name="Picture 6" descr="two reels">
-            <a:extLst>
-              <a:ext uri="{FF2B5EF4-FFF2-40B4-BE49-F238E27FC236}">
-                <a16:creationId xmlns:a16="http://schemas.microsoft.com/office/drawing/2014/main" id="{44ADFF6A-D6DC-401E-99E6-6A29F31F2BDD}"/>
-              </a:ext>
-            </a:extLst>
-          </p:cNvPr>
-          <p:cNvPicPr>
-            <a:picLocks noChangeAspect="1" noChangeArrowheads="1"/>
-          </p:cNvPicPr>
-          <p:nvPr/>
-        </p:nvPicPr>
-        <p:blipFill rotWithShape="1">
-          <a:blip r:embed="rId2">
-            <a:duotone>
-              <a:prstClr val="black"/>
-              <a:schemeClr val="tx2">
-                <a:tint val="45000"/>
-                <a:satMod val="400000"/>
-              </a:schemeClr>
-            </a:duotone>
-            <a:extLst>
-              <a:ext uri="{28A0092B-C50C-407E-A947-70E740481C1C}">
-                <a14:useLocalDpi xmlns:a14="http://schemas.microsoft.com/office/drawing/2010/main" val="0"/>
-              </a:ext>
-            </a:extLst>
-          </a:blip>
-          <a:srcRect t="-708" b="8305"/>
-          <a:stretch/>
-        </p:blipFill>
-        <p:spPr bwMode="auto">
-          <a:xfrm>
-            <a:off x="0" y="1324685"/>
-            <a:ext cx="6858000" cy="4226129"/>
-          </a:xfrm>
-          <a:prstGeom prst="rect">
-            <a:avLst/>
-          </a:prstGeom>
-          <a:noFill/>
-          <a:extLst>
-            <a:ext uri="{909E8E84-426E-40DD-AFC4-6F175D3DCCD1}">
-              <a14:hiddenFill xmlns:a14="http://schemas.microsoft.com/office/drawing/2010/main">
-                <a:solidFill>
-                  <a:srgbClr val="FFFFFF"/>
-                </a:solidFill>
-              </a14:hiddenFill>
-            </a:ext>
-          </a:extLst>
-        </p:spPr>
-      </p:pic>
+      <p:sp>
+        <p:nvSpPr>
+          <p:cNvPr id="2" name="Title 1">
+            <a:extLst>
+              <a:ext uri="{FF2B5EF4-FFF2-40B4-BE49-F238E27FC236}">
+                <a16:creationId xmlns:a16="http://schemas.microsoft.com/office/drawing/2014/main" id="{8147AA32-BAD8-468D-9C55-253FA071E819}"/>
+              </a:ext>
+            </a:extLst>
+          </p:cNvPr>
+          <p:cNvSpPr>
+            <a:spLocks noGrp="1"/>
+          </p:cNvSpPr>
+          <p:nvPr>
+            <p:ph type="title"/>
+          </p:nvPr>
+        </p:nvSpPr>
+        <p:spPr/>
+        <p:txBody>
+          <a:bodyPr/>
+          <a:lstStyle/>
+          <a:p>
+            <a:endParaRPr lang="en-US"/>
+          </a:p>
+        </p:txBody>
+      </p:sp>
+      <p:sp>
+        <p:nvSpPr>
+          <p:cNvPr id="3" name="Content Placeholder 2">
+            <a:extLst>
+              <a:ext uri="{FF2B5EF4-FFF2-40B4-BE49-F238E27FC236}">
+                <a16:creationId xmlns:a16="http://schemas.microsoft.com/office/drawing/2014/main" id="{9754974B-1768-44D7-9CB9-842D32DCE442}"/>
+              </a:ext>
+            </a:extLst>
+          </p:cNvPr>
+          <p:cNvSpPr>
+            <a:spLocks noGrp="1"/>
+          </p:cNvSpPr>
+          <p:nvPr>
+            <p:ph idx="1"/>
+          </p:nvPr>
+        </p:nvSpPr>
+        <p:spPr/>
+        <p:txBody>
+          <a:bodyPr/>
+          <a:lstStyle/>
+          <a:p>
+            <a:endParaRPr lang="en-US"/>
+          </a:p>
+        </p:txBody>
+      </p:sp>
     </p:spTree>
     <p:extLst>
       <p:ext uri="{BB962C8B-B14F-4D97-AF65-F5344CB8AC3E}">
-        <p14:creationId xmlns:p14="http://schemas.microsoft.com/office/powerpoint/2010/main" val="3553976100"/>
+        <p14:creationId xmlns:p14="http://schemas.microsoft.com/office/powerpoint/2010/main" val="1966285066"/>
       </p:ext>
     </p:extLst>
   </p:cSld>
@@ -11255,10 +11564,10 @@
       </p:grpSpPr>
       <p:pic>
         <p:nvPicPr>
-          <p:cNvPr id="2050" name="Picture 2" descr="https://i.ytimg.com/vi/hNCmb-4oXJA/maxresdefault.jpg">
-            <a:extLst>
-              <a:ext uri="{FF2B5EF4-FFF2-40B4-BE49-F238E27FC236}">
-                <a16:creationId xmlns:a16="http://schemas.microsoft.com/office/drawing/2014/main" id="{13617853-D4D5-4EFC-9CC7-A0C1E721DB9A}"/>
+          <p:cNvPr id="4" name="Picture 6" descr="two reels">
+            <a:extLst>
+              <a:ext uri="{FF2B5EF4-FFF2-40B4-BE49-F238E27FC236}">
+                <a16:creationId xmlns:a16="http://schemas.microsoft.com/office/drawing/2014/main" id="{C0675FDC-DF61-4848-A261-7BE95F856E58}"/>
               </a:ext>
             </a:extLst>
           </p:cNvPr>
@@ -11267,23 +11576,28 @@
           </p:cNvPicPr>
           <p:nvPr/>
         </p:nvPicPr>
-        <p:blipFill>
+        <p:blipFill rotWithShape="1">
           <a:blip r:embed="rId2">
+            <a:duotone>
+              <a:prstClr val="black"/>
+              <a:schemeClr val="tx2">
+                <a:tint val="45000"/>
+                <a:satMod val="400000"/>
+              </a:schemeClr>
+            </a:duotone>
             <a:extLst>
               <a:ext uri="{28A0092B-C50C-407E-A947-70E740481C1C}">
                 <a14:useLocalDpi xmlns:a14="http://schemas.microsoft.com/office/drawing/2010/main" val="0"/>
               </a:ext>
             </a:extLst>
           </a:blip>
-          <a:srcRect/>
-          <a:stretch>
-            <a:fillRect/>
-          </a:stretch>
+          <a:srcRect t="-708" b="8305"/>
+          <a:stretch/>
         </p:blipFill>
         <p:spPr bwMode="auto">
           <a:xfrm>
-            <a:off x="0" y="4167188"/>
-            <a:ext cx="6858000" cy="3857625"/>
+            <a:off x="0" y="1332305"/>
+            <a:ext cx="6858000" cy="4226129"/>
           </a:xfrm>
           <a:prstGeom prst="rect">
             <a:avLst/>
@@ -11300,66 +11614,12 @@
           </a:extLst>
         </p:spPr>
       </p:pic>
-      <p:sp>
-        <p:nvSpPr>
-          <p:cNvPr id="4" name="Rectangle 3">
-            <a:extLst>
-              <a:ext uri="{FF2B5EF4-FFF2-40B4-BE49-F238E27FC236}">
-                <a16:creationId xmlns:a16="http://schemas.microsoft.com/office/drawing/2014/main" id="{418FCA91-E191-4219-9ABC-4BFA1154855B}"/>
-              </a:ext>
-            </a:extLst>
-          </p:cNvPr>
-          <p:cNvSpPr/>
-          <p:nvPr/>
-        </p:nvSpPr>
-        <p:spPr>
-          <a:xfrm>
-            <a:off x="4030980" y="6926580"/>
-            <a:ext cx="2651760" cy="373380"/>
-          </a:xfrm>
-          <a:prstGeom prst="rect">
-            <a:avLst/>
-          </a:prstGeom>
-          <a:solidFill>
-            <a:srgbClr val="000000"/>
-          </a:solidFill>
-          <a:ln>
-            <a:solidFill>
-              <a:srgbClr val="000000"/>
-            </a:solidFill>
-          </a:ln>
-        </p:spPr>
-        <p:style>
-          <a:lnRef idx="2">
-            <a:schemeClr val="accent1">
-              <a:shade val="50000"/>
-            </a:schemeClr>
-          </a:lnRef>
-          <a:fillRef idx="1">
-            <a:schemeClr val="accent1"/>
-          </a:fillRef>
-          <a:effectRef idx="0">
-            <a:schemeClr val="accent1"/>
-          </a:effectRef>
-          <a:fontRef idx="minor">
-            <a:schemeClr val="lt1"/>
-          </a:fontRef>
-        </p:style>
-        <p:txBody>
-          <a:bodyPr rtlCol="0" anchor="ctr"/>
-          <a:lstStyle/>
-          <a:p>
-            <a:pPr algn="ctr"/>
-            <a:endParaRPr lang="en-US"/>
-          </a:p>
-        </p:txBody>
-      </p:sp>
       <p:pic>
         <p:nvPicPr>
-          <p:cNvPr id="2052" name="Picture 4" descr="Image result for whiplash 2014">
-            <a:extLst>
-              <a:ext uri="{FF2B5EF4-FFF2-40B4-BE49-F238E27FC236}">
-                <a16:creationId xmlns:a16="http://schemas.microsoft.com/office/drawing/2014/main" id="{B6BF8C5A-E84B-425E-A890-69969C3EF1BE}"/>
+          <p:cNvPr id="5" name="Picture 6" descr="two reels">
+            <a:extLst>
+              <a:ext uri="{FF2B5EF4-FFF2-40B4-BE49-F238E27FC236}">
+                <a16:creationId xmlns:a16="http://schemas.microsoft.com/office/drawing/2014/main" id="{9A0FC2AA-4BDB-4DD4-AAD3-79A03F67CE04}"/>
               </a:ext>
             </a:extLst>
           </p:cNvPr>
@@ -11368,23 +11628,28 @@
           </p:cNvPicPr>
           <p:nvPr/>
         </p:nvPicPr>
-        <p:blipFill>
-          <a:blip r:embed="rId3">
+        <p:blipFill rotWithShape="1">
+          <a:blip r:embed="rId2">
+            <a:duotone>
+              <a:prstClr val="black"/>
+              <a:schemeClr val="tx2">
+                <a:tint val="45000"/>
+                <a:satMod val="400000"/>
+              </a:schemeClr>
+            </a:duotone>
             <a:extLst>
               <a:ext uri="{28A0092B-C50C-407E-A947-70E740481C1C}">
                 <a14:useLocalDpi xmlns:a14="http://schemas.microsoft.com/office/drawing/2010/main" val="0"/>
               </a:ext>
             </a:extLst>
           </a:blip>
-          <a:srcRect/>
-          <a:stretch>
-            <a:fillRect/>
-          </a:stretch>
+          <a:srcRect t="-708" b="8305"/>
+          <a:stretch/>
         </p:blipFill>
         <p:spPr bwMode="auto">
           <a:xfrm>
-            <a:off x="76200" y="5871210"/>
-            <a:ext cx="6858000" cy="2857500"/>
+            <a:off x="-1" y="6292679"/>
+            <a:ext cx="6858000" cy="4226129"/>
           </a:xfrm>
           <a:prstGeom prst="rect">
             <a:avLst/>
@@ -11401,42 +11666,69 @@
           </a:extLst>
         </p:spPr>
       </p:pic>
-    </p:spTree>
-    <p:extLst>
-      <p:ext uri="{BB962C8B-B14F-4D97-AF65-F5344CB8AC3E}">
-        <p14:creationId xmlns:p14="http://schemas.microsoft.com/office/powerpoint/2010/main" val="3852054987"/>
-      </p:ext>
-    </p:extLst>
-  </p:cSld>
-  <p:clrMapOvr>
-    <a:masterClrMapping/>
-  </p:clrMapOvr>
-</p:sld>
-</file>
-
-<file path=ppt/slides/slide7.xml><?xml version="1.0" encoding="utf-8"?>
-<p:sld xmlns:a="http://schemas.openxmlformats.org/drawingml/2006/main" xmlns:r="http://schemas.openxmlformats.org/officeDocument/2006/relationships" xmlns:p="http://schemas.openxmlformats.org/presentationml/2006/main">
-  <p:cSld>
-    <p:spTree>
-      <p:nvGrpSpPr>
-        <p:cNvPr id="1" name=""/>
-        <p:cNvGrpSpPr/>
-        <p:nvPr/>
-      </p:nvGrpSpPr>
-      <p:grpSpPr>
-        <a:xfrm>
-          <a:off x="0" y="0"/>
-          <a:ext cx="0" cy="0"/>
-          <a:chOff x="0" y="0"/>
-          <a:chExt cx="0" cy="0"/>
-        </a:xfrm>
-      </p:grpSpPr>
+      <p:sp>
+        <p:nvSpPr>
+          <p:cNvPr id="6" name="Rectangle 5">
+            <a:extLst>
+              <a:ext uri="{FF2B5EF4-FFF2-40B4-BE49-F238E27FC236}">
+                <a16:creationId xmlns:a16="http://schemas.microsoft.com/office/drawing/2014/main" id="{8670447E-D037-4A85-9630-12DD99E1CB2F}"/>
+              </a:ext>
+            </a:extLst>
+          </p:cNvPr>
+          <p:cNvSpPr/>
+          <p:nvPr/>
+        </p:nvSpPr>
+        <p:spPr>
+          <a:xfrm>
+            <a:off x="-2" y="6326158"/>
+            <a:ext cx="6858000" cy="4194630"/>
+          </a:xfrm>
+          <a:prstGeom prst="rect">
+            <a:avLst/>
+          </a:prstGeom>
+          <a:solidFill>
+            <a:schemeClr val="accent1">
+              <a:lumMod val="50000"/>
+              <a:alpha val="72000"/>
+            </a:schemeClr>
+          </a:solidFill>
+          <a:ln>
+            <a:noFill/>
+          </a:ln>
+        </p:spPr>
+        <p:style>
+          <a:lnRef idx="2">
+            <a:schemeClr val="accent1">
+              <a:shade val="50000"/>
+            </a:schemeClr>
+          </a:lnRef>
+          <a:fillRef idx="1">
+            <a:schemeClr val="accent1"/>
+          </a:fillRef>
+          <a:effectRef idx="0">
+            <a:schemeClr val="accent1"/>
+          </a:effectRef>
+          <a:fontRef idx="minor">
+            <a:schemeClr val="lt1"/>
+          </a:fontRef>
+        </p:style>
+        <p:txBody>
+          <a:bodyPr rtlCol="0" anchor="ctr"/>
+          <a:lstStyle/>
+          <a:p>
+            <a:pPr algn="ctr"/>
+            <a:endParaRPr lang="en-US" dirty="0">
+              <a:latin typeface="Agency FB" panose="020B0503020202020204" pitchFamily="34" charset="0"/>
+            </a:endParaRPr>
+          </a:p>
+        </p:txBody>
+      </p:sp>
       <p:pic>
         <p:nvPicPr>
-          <p:cNvPr id="4" name="Picture 4" descr="Image result for whiplash 2014">
-            <a:extLst>
-              <a:ext uri="{FF2B5EF4-FFF2-40B4-BE49-F238E27FC236}">
-                <a16:creationId xmlns:a16="http://schemas.microsoft.com/office/drawing/2014/main" id="{F428291A-29B3-4617-811A-F6B9D3B6571C}"/>
+          <p:cNvPr id="7" name="Picture 6" descr="two reels">
+            <a:extLst>
+              <a:ext uri="{FF2B5EF4-FFF2-40B4-BE49-F238E27FC236}">
+                <a16:creationId xmlns:a16="http://schemas.microsoft.com/office/drawing/2014/main" id="{44ADFF6A-D6DC-401E-99E6-6A29F31F2BDD}"/>
               </a:ext>
             </a:extLst>
           </p:cNvPr>
@@ -11445,23 +11737,28 @@
           </p:cNvPicPr>
           <p:nvPr/>
         </p:nvPicPr>
-        <p:blipFill>
+        <p:blipFill rotWithShape="1">
           <a:blip r:embed="rId2">
+            <a:duotone>
+              <a:prstClr val="black"/>
+              <a:schemeClr val="tx2">
+                <a:tint val="45000"/>
+                <a:satMod val="400000"/>
+              </a:schemeClr>
+            </a:duotone>
             <a:extLst>
               <a:ext uri="{28A0092B-C50C-407E-A947-70E740481C1C}">
                 <a14:useLocalDpi xmlns:a14="http://schemas.microsoft.com/office/drawing/2010/main" val="0"/>
               </a:ext>
             </a:extLst>
           </a:blip>
-          <a:srcRect/>
-          <a:stretch>
-            <a:fillRect/>
-          </a:stretch>
+          <a:srcRect t="-708" b="8305"/>
+          <a:stretch/>
         </p:blipFill>
         <p:spPr bwMode="auto">
           <a:xfrm>
-            <a:off x="0" y="4667250"/>
-            <a:ext cx="6858000" cy="2857500"/>
+            <a:off x="0" y="1324685"/>
+            <a:ext cx="6858000" cy="4226129"/>
           </a:xfrm>
           <a:prstGeom prst="rect">
             <a:avLst/>
@@ -11481,7 +11778,7 @@
     </p:spTree>
     <p:extLst>
       <p:ext uri="{BB962C8B-B14F-4D97-AF65-F5344CB8AC3E}">
-        <p14:creationId xmlns:p14="http://schemas.microsoft.com/office/powerpoint/2010/main" val="3400983693"/>
+        <p14:creationId xmlns:p14="http://schemas.microsoft.com/office/powerpoint/2010/main" val="3553976100"/>
       </p:ext>
     </p:extLst>
   </p:cSld>

</xml_diff>